<commit_message>
Minor modification to Figures:
</commit_message>
<xml_diff>
--- a/SEC_Manuscript-Figures.pptx
+++ b/SEC_Manuscript-Figures.pptx
@@ -4357,10 +4357,10 @@
                     <a:lstStyle/>
                     <a:p>
                       <a:r>
-                        <a:rPr lang="en-US" smtClean="0"/>
+                        <a:rPr lang="en-US" dirty="0" smtClean="0"/>
                         <a:t>Within-population dynamics</a:t>
                       </a:r>
-                      <a:endParaRPr lang="en-US"/>
+                      <a:endParaRPr lang="en-US" dirty="0"/>
                     </a:p>
                   </p:txBody>
                 </p:sp>
@@ -4387,7 +4387,7 @@
                     <a:lstStyle/>
                     <a:p>
                       <a:r>
-                        <a:rPr lang="en-US" smtClean="0"/>
+                        <a:rPr lang="en-US" dirty="0" smtClean="0"/>
                         <a:t>Selection</a:t>
                       </a:r>
                     </a:p>
@@ -5507,7 +5507,7 @@
           <p:spPr>
             <a:xfrm>
               <a:off x="4787830" y="4637361"/>
-              <a:ext cx="1118319" cy="369332"/>
+              <a:ext cx="1111907" cy="369332"/>
             </a:xfrm>
             <a:prstGeom prst="rect">
               <a:avLst/>
@@ -5525,8 +5525,8 @@
                 <a:t>p</a:t>
               </a:r>
               <a:r>
-                <a:rPr lang="en-US" baseline="-25000" dirty="0" err="1" smtClean="0"/>
-                <a:t>A</a:t>
+                <a:rPr lang="en-US" baseline="-25000" dirty="0" err="1"/>
+                <a:t>B</a:t>
               </a:r>
               <a:r>
                 <a:rPr lang="en-US" baseline="-25000" dirty="0" smtClean="0"/>
@@ -5557,7 +5557,7 @@
           <p:spPr>
             <a:xfrm>
               <a:off x="7189160" y="4631309"/>
-              <a:ext cx="1118319" cy="369332"/>
+              <a:ext cx="1111907" cy="369332"/>
             </a:xfrm>
             <a:prstGeom prst="rect">
               <a:avLst/>
@@ -5575,8 +5575,8 @@
                 <a:t>p</a:t>
               </a:r>
               <a:r>
-                <a:rPr lang="en-US" baseline="-25000" dirty="0" err="1" smtClean="0"/>
-                <a:t>A</a:t>
+                <a:rPr lang="en-US" baseline="-25000" dirty="0" err="1"/>
+                <a:t>B</a:t>
               </a:r>
               <a:r>
                 <a:rPr lang="en-US" baseline="-25000" dirty="0" smtClean="0"/>
@@ -5607,7 +5607,7 @@
           <p:spPr>
             <a:xfrm>
               <a:off x="4809090" y="5431259"/>
-              <a:ext cx="1073435" cy="369332"/>
+              <a:ext cx="1067023" cy="369332"/>
             </a:xfrm>
             <a:prstGeom prst="rect">
               <a:avLst/>
@@ -5621,12 +5621,12 @@
             <a:lstStyle/>
             <a:p>
               <a:r>
-                <a:rPr lang="en-US" dirty="0" err="1"/>
+                <a:rPr lang="en-US" dirty="0" err="1" smtClean="0"/>
                 <a:t>q</a:t>
               </a:r>
               <a:r>
-                <a:rPr lang="en-US" baseline="-25000" dirty="0" err="1" smtClean="0"/>
-                <a:t>A</a:t>
+                <a:rPr lang="en-US" baseline="-25000" dirty="0" err="1"/>
+                <a:t>B</a:t>
               </a:r>
               <a:r>
                 <a:rPr lang="en-US" baseline="-25000" dirty="0" smtClean="0"/>
@@ -5661,7 +5661,7 @@
           <p:spPr>
             <a:xfrm>
               <a:off x="7205174" y="5431259"/>
-              <a:ext cx="1073435" cy="369332"/>
+              <a:ext cx="1067023" cy="369332"/>
             </a:xfrm>
             <a:prstGeom prst="rect">
               <a:avLst/>
@@ -5675,12 +5675,12 @@
             <a:lstStyle/>
             <a:p>
               <a:r>
-                <a:rPr lang="en-US" dirty="0" err="1"/>
+                <a:rPr lang="en-US" dirty="0" err="1" smtClean="0"/>
                 <a:t>q</a:t>
               </a:r>
               <a:r>
-                <a:rPr lang="en-US" baseline="-25000" dirty="0" err="1" smtClean="0"/>
-                <a:t>A</a:t>
+                <a:rPr lang="en-US" baseline="-25000" dirty="0" err="1"/>
+                <a:t>B</a:t>
               </a:r>
               <a:r>
                 <a:rPr lang="en-US" baseline="-25000" dirty="0" smtClean="0"/>

</xml_diff>

<commit_message>
Added selection function figure
</commit_message>
<xml_diff>
--- a/SEC_Manuscript-Figures.pptx
+++ b/SEC_Manuscript-Figures.pptx
@@ -6,6 +6,7 @@
   </p:sldMasterIdLst>
   <p:sldIdLst>
     <p:sldId id="257" r:id="rId2"/>
+    <p:sldId id="258" r:id="rId3"/>
   </p:sldIdLst>
   <p:sldSz cx="12192000" cy="6858000"/>
   <p:notesSz cx="6858000" cy="9144000"/>
@@ -104,6 +105,11 @@
       </a:defRPr>
     </a:lvl9pPr>
   </p:defaultTextStyle>
+  <p:extLst>
+    <p:ext uri="{EFAFB233-063F-42B5-8137-9DF3F51BA10A}">
+      <p15:sldGuideLst xmlns:p15="http://schemas.microsoft.com/office/powerpoint/2012/main"/>
+    </p:ext>
+  </p:extLst>
 </p:presentation>
 </file>
 
@@ -238,7 +244,7 @@
           <a:p>
             <a:fld id="{6D9C80F4-8888-534D-AD21-F6936D7DD69E}" type="datetimeFigureOut">
               <a:rPr lang="en-US" smtClean="0"/>
-              <a:t>12/14/17</a:t>
+              <a:t>12/18/17</a:t>
             </a:fld>
             <a:endParaRPr lang="en-US"/>
           </a:p>
@@ -408,7 +414,7 @@
           <a:p>
             <a:fld id="{6D9C80F4-8888-534D-AD21-F6936D7DD69E}" type="datetimeFigureOut">
               <a:rPr lang="en-US" smtClean="0"/>
-              <a:t>12/14/17</a:t>
+              <a:t>12/18/17</a:t>
             </a:fld>
             <a:endParaRPr lang="en-US"/>
           </a:p>
@@ -588,7 +594,7 @@
           <a:p>
             <a:fld id="{6D9C80F4-8888-534D-AD21-F6936D7DD69E}" type="datetimeFigureOut">
               <a:rPr lang="en-US" smtClean="0"/>
-              <a:t>12/14/17</a:t>
+              <a:t>12/18/17</a:t>
             </a:fld>
             <a:endParaRPr lang="en-US"/>
           </a:p>
@@ -758,7 +764,7 @@
           <a:p>
             <a:fld id="{6D9C80F4-8888-534D-AD21-F6936D7DD69E}" type="datetimeFigureOut">
               <a:rPr lang="en-US" smtClean="0"/>
-              <a:t>12/14/17</a:t>
+              <a:t>12/18/17</a:t>
             </a:fld>
             <a:endParaRPr lang="en-US"/>
           </a:p>
@@ -1004,7 +1010,7 @@
           <a:p>
             <a:fld id="{6D9C80F4-8888-534D-AD21-F6936D7DD69E}" type="datetimeFigureOut">
               <a:rPr lang="en-US" smtClean="0"/>
-              <a:t>12/14/17</a:t>
+              <a:t>12/18/17</a:t>
             </a:fld>
             <a:endParaRPr lang="en-US"/>
           </a:p>
@@ -1236,7 +1242,7 @@
           <a:p>
             <a:fld id="{6D9C80F4-8888-534D-AD21-F6936D7DD69E}" type="datetimeFigureOut">
               <a:rPr lang="en-US" smtClean="0"/>
-              <a:t>12/14/17</a:t>
+              <a:t>12/18/17</a:t>
             </a:fld>
             <a:endParaRPr lang="en-US"/>
           </a:p>
@@ -1603,7 +1609,7 @@
           <a:p>
             <a:fld id="{6D9C80F4-8888-534D-AD21-F6936D7DD69E}" type="datetimeFigureOut">
               <a:rPr lang="en-US" smtClean="0"/>
-              <a:t>12/14/17</a:t>
+              <a:t>12/18/17</a:t>
             </a:fld>
             <a:endParaRPr lang="en-US"/>
           </a:p>
@@ -1721,7 +1727,7 @@
           <a:p>
             <a:fld id="{6D9C80F4-8888-534D-AD21-F6936D7DD69E}" type="datetimeFigureOut">
               <a:rPr lang="en-US" smtClean="0"/>
-              <a:t>12/14/17</a:t>
+              <a:t>12/18/17</a:t>
             </a:fld>
             <a:endParaRPr lang="en-US"/>
           </a:p>
@@ -1816,7 +1822,7 @@
           <a:p>
             <a:fld id="{6D9C80F4-8888-534D-AD21-F6936D7DD69E}" type="datetimeFigureOut">
               <a:rPr lang="en-US" smtClean="0"/>
-              <a:t>12/14/17</a:t>
+              <a:t>12/18/17</a:t>
             </a:fld>
             <a:endParaRPr lang="en-US"/>
           </a:p>
@@ -2093,7 +2099,7 @@
           <a:p>
             <a:fld id="{6D9C80F4-8888-534D-AD21-F6936D7DD69E}" type="datetimeFigureOut">
               <a:rPr lang="en-US" smtClean="0"/>
-              <a:t>12/14/17</a:t>
+              <a:t>12/18/17</a:t>
             </a:fld>
             <a:endParaRPr lang="en-US"/>
           </a:p>
@@ -2346,7 +2352,7 @@
           <a:p>
             <a:fld id="{6D9C80F4-8888-534D-AD21-F6936D7DD69E}" type="datetimeFigureOut">
               <a:rPr lang="en-US" smtClean="0"/>
-              <a:t>12/14/17</a:t>
+              <a:t>12/18/17</a:t>
             </a:fld>
             <a:endParaRPr lang="en-US"/>
           </a:p>
@@ -2559,7 +2565,7 @@
           <a:p>
             <a:fld id="{6D9C80F4-8888-534D-AD21-F6936D7DD69E}" type="datetimeFigureOut">
               <a:rPr lang="en-US" smtClean="0"/>
-              <a:t>12/14/17</a:t>
+              <a:t>12/18/17</a:t>
             </a:fld>
             <a:endParaRPr lang="en-US"/>
           </a:p>
@@ -5731,11 +5737,7 @@
           <a:p>
             <a:r>
               <a:rPr lang="en-US" dirty="0" smtClean="0"/>
-              <a:t>Figure </a:t>
-            </a:r>
-            <a:r>
-              <a:rPr lang="en-US" dirty="0" smtClean="0"/>
-              <a:t>1</a:t>
+              <a:t>Figure 1</a:t>
             </a:r>
             <a:endParaRPr lang="en-US" dirty="0"/>
           </a:p>
@@ -5758,6 +5760,758 @@
       </p:par>
     </p:tnLst>
   </p:timing>
+</p:sld>
+</file>
+
+<file path=ppt/slides/slide2.xml><?xml version="1.0" encoding="utf-8"?>
+<p:sld xmlns:a="http://schemas.openxmlformats.org/drawingml/2006/main" xmlns:r="http://schemas.openxmlformats.org/officeDocument/2006/relationships" xmlns:p="http://schemas.openxmlformats.org/presentationml/2006/main">
+  <p:cSld>
+    <p:spTree>
+      <p:nvGrpSpPr>
+        <p:cNvPr id="1" name=""/>
+        <p:cNvGrpSpPr/>
+        <p:nvPr/>
+      </p:nvGrpSpPr>
+      <p:grpSpPr>
+        <a:xfrm>
+          <a:off x="0" y="0"/>
+          <a:ext cx="0" cy="0"/>
+          <a:chOff x="0" y="0"/>
+          <a:chExt cx="0" cy="0"/>
+        </a:xfrm>
+      </p:grpSpPr>
+      <p:grpSp>
+        <p:nvGrpSpPr>
+          <p:cNvPr id="44" name="Group 43"/>
+          <p:cNvGrpSpPr/>
+          <p:nvPr/>
+        </p:nvGrpSpPr>
+        <p:grpSpPr>
+          <a:xfrm>
+            <a:off x="1117413" y="1204579"/>
+            <a:ext cx="7152397" cy="3201746"/>
+            <a:chOff x="1117413" y="1204579"/>
+            <a:chExt cx="7152397" cy="3201746"/>
+          </a:xfrm>
+        </p:grpSpPr>
+        <p:cxnSp>
+          <p:nvCxnSpPr>
+            <p:cNvPr id="26" name="Straight Arrow Connector 25"/>
+            <p:cNvCxnSpPr/>
+            <p:nvPr/>
+          </p:nvCxnSpPr>
+          <p:spPr>
+            <a:xfrm>
+              <a:off x="2289070" y="1544989"/>
+              <a:ext cx="0" cy="2861336"/>
+            </a:xfrm>
+            <a:prstGeom prst="straightConnector1">
+              <a:avLst/>
+            </a:prstGeom>
+            <a:ln w="38100">
+              <a:solidFill>
+                <a:schemeClr val="tx1"/>
+              </a:solidFill>
+              <a:headEnd type="triangle"/>
+              <a:tailEnd type="triangle"/>
+            </a:ln>
+          </p:spPr>
+          <p:style>
+            <a:lnRef idx="1">
+              <a:schemeClr val="accent1"/>
+            </a:lnRef>
+            <a:fillRef idx="0">
+              <a:schemeClr val="accent1"/>
+            </a:fillRef>
+            <a:effectRef idx="0">
+              <a:schemeClr val="accent1"/>
+            </a:effectRef>
+            <a:fontRef idx="minor">
+              <a:schemeClr val="tx1"/>
+            </a:fontRef>
+          </p:style>
+        </p:cxnSp>
+        <p:sp>
+          <p:nvSpPr>
+            <p:cNvPr id="10" name="TextBox 9"/>
+            <p:cNvSpPr txBox="1"/>
+            <p:nvPr/>
+          </p:nvSpPr>
+          <p:spPr>
+            <a:xfrm>
+              <a:off x="1117413" y="3871941"/>
+              <a:ext cx="1124026" cy="307777"/>
+            </a:xfrm>
+            <a:prstGeom prst="rect">
+              <a:avLst/>
+            </a:prstGeom>
+            <a:noFill/>
+          </p:spPr>
+          <p:txBody>
+            <a:bodyPr wrap="none" rtlCol="0">
+              <a:spAutoFit/>
+            </a:bodyPr>
+            <a:lstStyle/>
+            <a:p>
+              <a:pPr algn="ctr"/>
+              <a:r>
+                <a:rPr lang="en-US" sz="1400" dirty="0" smtClean="0"/>
+                <a:t>–Maximum </a:t>
+              </a:r>
+              <a:r>
+                <a:rPr lang="en-US" sz="1400" i="1" dirty="0" smtClean="0"/>
+                <a:t>s</a:t>
+              </a:r>
+              <a:endParaRPr lang="en-US" sz="1400" i="1" dirty="0"/>
+            </a:p>
+          </p:txBody>
+        </p:sp>
+        <p:sp>
+          <p:nvSpPr>
+            <p:cNvPr id="11" name="TextBox 10"/>
+            <p:cNvSpPr txBox="1"/>
+            <p:nvPr/>
+          </p:nvSpPr>
+          <p:spPr>
+            <a:xfrm>
+              <a:off x="1162297" y="1743876"/>
+              <a:ext cx="1034257" cy="307777"/>
+            </a:xfrm>
+            <a:prstGeom prst="rect">
+              <a:avLst/>
+            </a:prstGeom>
+            <a:noFill/>
+          </p:spPr>
+          <p:txBody>
+            <a:bodyPr wrap="none" rtlCol="0">
+              <a:spAutoFit/>
+            </a:bodyPr>
+            <a:lstStyle/>
+            <a:p>
+              <a:pPr algn="ctr"/>
+              <a:r>
+                <a:rPr lang="en-US" sz="1400" dirty="0" smtClean="0"/>
+                <a:t>Maximum </a:t>
+              </a:r>
+              <a:r>
+                <a:rPr lang="en-US" sz="1400" i="1" dirty="0" smtClean="0"/>
+                <a:t>s</a:t>
+              </a:r>
+              <a:endParaRPr lang="en-US" sz="1400" i="1" dirty="0"/>
+            </a:p>
+          </p:txBody>
+        </p:sp>
+        <p:sp>
+          <p:nvSpPr>
+            <p:cNvPr id="12" name="Oval 11"/>
+            <p:cNvSpPr/>
+            <p:nvPr/>
+          </p:nvSpPr>
+          <p:spPr>
+            <a:xfrm>
+              <a:off x="2232561" y="3968141"/>
+              <a:ext cx="116977" cy="116977"/>
+            </a:xfrm>
+            <a:prstGeom prst="ellipse">
+              <a:avLst/>
+            </a:prstGeom>
+            <a:solidFill>
+              <a:schemeClr val="tx1"/>
+            </a:solidFill>
+            <a:ln>
+              <a:solidFill>
+                <a:schemeClr val="tx1"/>
+              </a:solidFill>
+            </a:ln>
+          </p:spPr>
+          <p:style>
+            <a:lnRef idx="2">
+              <a:schemeClr val="accent1">
+                <a:shade val="50000"/>
+              </a:schemeClr>
+            </a:lnRef>
+            <a:fillRef idx="1">
+              <a:schemeClr val="accent1"/>
+            </a:fillRef>
+            <a:effectRef idx="0">
+              <a:schemeClr val="accent1"/>
+            </a:effectRef>
+            <a:fontRef idx="minor">
+              <a:schemeClr val="lt1"/>
+            </a:fontRef>
+          </p:style>
+          <p:txBody>
+            <a:bodyPr rtlCol="0" anchor="ctr"/>
+            <a:lstStyle/>
+            <a:p>
+              <a:pPr algn="ctr"/>
+              <a:endParaRPr lang="en-US"/>
+            </a:p>
+          </p:txBody>
+        </p:sp>
+        <p:sp>
+          <p:nvSpPr>
+            <p:cNvPr id="13" name="Oval 12"/>
+            <p:cNvSpPr/>
+            <p:nvPr/>
+          </p:nvSpPr>
+          <p:spPr>
+            <a:xfrm>
+              <a:off x="5842655" y="1839277"/>
+              <a:ext cx="116977" cy="116977"/>
+            </a:xfrm>
+            <a:prstGeom prst="ellipse">
+              <a:avLst/>
+            </a:prstGeom>
+            <a:solidFill>
+              <a:schemeClr val="tx1"/>
+            </a:solidFill>
+            <a:ln>
+              <a:solidFill>
+                <a:schemeClr val="tx1"/>
+              </a:solidFill>
+            </a:ln>
+          </p:spPr>
+          <p:style>
+            <a:lnRef idx="2">
+              <a:schemeClr val="accent1">
+                <a:shade val="50000"/>
+              </a:schemeClr>
+            </a:lnRef>
+            <a:fillRef idx="1">
+              <a:schemeClr val="accent1"/>
+            </a:fillRef>
+            <a:effectRef idx="0">
+              <a:schemeClr val="accent1"/>
+            </a:effectRef>
+            <a:fontRef idx="minor">
+              <a:schemeClr val="lt1"/>
+            </a:fontRef>
+          </p:style>
+          <p:txBody>
+            <a:bodyPr rtlCol="0" anchor="ctr"/>
+            <a:lstStyle/>
+            <a:p>
+              <a:pPr algn="ctr"/>
+              <a:endParaRPr lang="en-US"/>
+            </a:p>
+          </p:txBody>
+        </p:sp>
+        <p:sp>
+          <p:nvSpPr>
+            <p:cNvPr id="14" name="TextBox 13"/>
+            <p:cNvSpPr txBox="1"/>
+            <p:nvPr/>
+          </p:nvSpPr>
+          <p:spPr>
+            <a:xfrm>
+              <a:off x="2256312" y="2980707"/>
+              <a:ext cx="276038" cy="307777"/>
+            </a:xfrm>
+            <a:prstGeom prst="rect">
+              <a:avLst/>
+            </a:prstGeom>
+            <a:noFill/>
+          </p:spPr>
+          <p:txBody>
+            <a:bodyPr wrap="none" rtlCol="0">
+              <a:spAutoFit/>
+            </a:bodyPr>
+            <a:lstStyle/>
+            <a:p>
+              <a:r>
+                <a:rPr lang="en-US" sz="1400" dirty="0" smtClean="0"/>
+                <a:t>0</a:t>
+              </a:r>
+              <a:endParaRPr lang="en-US" sz="1400" dirty="0"/>
+            </a:p>
+          </p:txBody>
+        </p:sp>
+        <p:cxnSp>
+          <p:nvCxnSpPr>
+            <p:cNvPr id="16" name="Straight Connector 15"/>
+            <p:cNvCxnSpPr/>
+            <p:nvPr/>
+          </p:nvCxnSpPr>
+          <p:spPr>
+            <a:xfrm>
+              <a:off x="4115688" y="2861954"/>
+              <a:ext cx="0" cy="184666"/>
+            </a:xfrm>
+            <a:prstGeom prst="line">
+              <a:avLst/>
+            </a:prstGeom>
+            <a:ln w="28575">
+              <a:solidFill>
+                <a:schemeClr val="tx1"/>
+              </a:solidFill>
+            </a:ln>
+          </p:spPr>
+          <p:style>
+            <a:lnRef idx="1">
+              <a:schemeClr val="accent1"/>
+            </a:lnRef>
+            <a:fillRef idx="0">
+              <a:schemeClr val="accent1"/>
+            </a:fillRef>
+            <a:effectRef idx="0">
+              <a:schemeClr val="accent1"/>
+            </a:effectRef>
+            <a:fontRef idx="minor">
+              <a:schemeClr val="tx1"/>
+            </a:fontRef>
+          </p:style>
+        </p:cxnSp>
+        <p:cxnSp>
+          <p:nvCxnSpPr>
+            <p:cNvPr id="17" name="Straight Connector 16"/>
+            <p:cNvCxnSpPr/>
+            <p:nvPr/>
+          </p:nvCxnSpPr>
+          <p:spPr>
+            <a:xfrm>
+              <a:off x="5906884" y="2871850"/>
+              <a:ext cx="0" cy="184666"/>
+            </a:xfrm>
+            <a:prstGeom prst="line">
+              <a:avLst/>
+            </a:prstGeom>
+            <a:ln w="28575">
+              <a:solidFill>
+                <a:schemeClr val="tx1"/>
+              </a:solidFill>
+            </a:ln>
+          </p:spPr>
+          <p:style>
+            <a:lnRef idx="1">
+              <a:schemeClr val="accent1"/>
+            </a:lnRef>
+            <a:fillRef idx="0">
+              <a:schemeClr val="accent1"/>
+            </a:fillRef>
+            <a:effectRef idx="0">
+              <a:schemeClr val="accent1"/>
+            </a:effectRef>
+            <a:fontRef idx="minor">
+              <a:schemeClr val="tx1"/>
+            </a:fontRef>
+          </p:style>
+        </p:cxnSp>
+        <p:sp>
+          <p:nvSpPr>
+            <p:cNvPr id="20" name="TextBox 19"/>
+            <p:cNvSpPr txBox="1"/>
+            <p:nvPr/>
+          </p:nvSpPr>
+          <p:spPr>
+            <a:xfrm>
+              <a:off x="3940627" y="2978727"/>
+              <a:ext cx="367408" cy="307777"/>
+            </a:xfrm>
+            <a:prstGeom prst="rect">
+              <a:avLst/>
+            </a:prstGeom>
+            <a:noFill/>
+          </p:spPr>
+          <p:txBody>
+            <a:bodyPr wrap="none" rtlCol="0">
+              <a:spAutoFit/>
+            </a:bodyPr>
+            <a:lstStyle/>
+            <a:p>
+              <a:r>
+                <a:rPr lang="en-US" sz="1400" dirty="0" smtClean="0"/>
+                <a:t>20</a:t>
+              </a:r>
+              <a:endParaRPr lang="en-US" sz="1400" dirty="0"/>
+            </a:p>
+          </p:txBody>
+        </p:sp>
+        <p:cxnSp>
+          <p:nvCxnSpPr>
+            <p:cNvPr id="23" name="Straight Arrow Connector 22"/>
+            <p:cNvCxnSpPr/>
+            <p:nvPr/>
+          </p:nvCxnSpPr>
+          <p:spPr>
+            <a:xfrm>
+              <a:off x="2289070" y="2954287"/>
+              <a:ext cx="3957351" cy="0"/>
+            </a:xfrm>
+            <a:prstGeom prst="straightConnector1">
+              <a:avLst/>
+            </a:prstGeom>
+            <a:ln w="38100">
+              <a:solidFill>
+                <a:schemeClr val="tx1"/>
+              </a:solidFill>
+              <a:tailEnd type="triangle"/>
+            </a:ln>
+          </p:spPr>
+          <p:style>
+            <a:lnRef idx="1">
+              <a:schemeClr val="accent1"/>
+            </a:lnRef>
+            <a:fillRef idx="0">
+              <a:schemeClr val="accent1"/>
+            </a:fillRef>
+            <a:effectRef idx="0">
+              <a:schemeClr val="accent1"/>
+            </a:effectRef>
+            <a:fontRef idx="minor">
+              <a:schemeClr val="tx1"/>
+            </a:fontRef>
+          </p:style>
+        </p:cxnSp>
+        <p:sp>
+          <p:nvSpPr>
+            <p:cNvPr id="24" name="TextBox 23"/>
+            <p:cNvSpPr txBox="1"/>
+            <p:nvPr/>
+          </p:nvSpPr>
+          <p:spPr>
+            <a:xfrm>
+              <a:off x="5721282" y="2978727"/>
+              <a:ext cx="367408" cy="307777"/>
+            </a:xfrm>
+            <a:prstGeom prst="rect">
+              <a:avLst/>
+            </a:prstGeom>
+            <a:noFill/>
+          </p:spPr>
+          <p:txBody>
+            <a:bodyPr wrap="none" rtlCol="0">
+              <a:spAutoFit/>
+            </a:bodyPr>
+            <a:lstStyle/>
+            <a:p>
+              <a:r>
+                <a:rPr lang="en-US" sz="1400" smtClean="0"/>
+                <a:t>39</a:t>
+              </a:r>
+              <a:endParaRPr lang="en-US" sz="1400" dirty="0"/>
+            </a:p>
+          </p:txBody>
+        </p:sp>
+        <p:cxnSp>
+          <p:nvCxnSpPr>
+            <p:cNvPr id="28" name="Straight Connector 27"/>
+            <p:cNvCxnSpPr>
+              <a:stCxn id="12" idx="6"/>
+              <a:endCxn id="13" idx="3"/>
+            </p:cNvCxnSpPr>
+            <p:nvPr/>
+          </p:nvCxnSpPr>
+          <p:spPr>
+            <a:xfrm flipV="1">
+              <a:off x="2349538" y="1939123"/>
+              <a:ext cx="3510248" cy="2087507"/>
+            </a:xfrm>
+            <a:prstGeom prst="line">
+              <a:avLst/>
+            </a:prstGeom>
+            <a:ln w="28575">
+              <a:solidFill>
+                <a:schemeClr val="tx1"/>
+              </a:solidFill>
+            </a:ln>
+          </p:spPr>
+          <p:style>
+            <a:lnRef idx="1">
+              <a:schemeClr val="accent1"/>
+            </a:lnRef>
+            <a:fillRef idx="0">
+              <a:schemeClr val="accent1"/>
+            </a:fillRef>
+            <a:effectRef idx="0">
+              <a:schemeClr val="accent1"/>
+            </a:effectRef>
+            <a:fontRef idx="minor">
+              <a:schemeClr val="tx1"/>
+            </a:fontRef>
+          </p:style>
+        </p:cxnSp>
+        <p:cxnSp>
+          <p:nvCxnSpPr>
+            <p:cNvPr id="35" name="Straight Connector 34"/>
+            <p:cNvCxnSpPr/>
+            <p:nvPr/>
+          </p:nvCxnSpPr>
+          <p:spPr>
+            <a:xfrm>
+              <a:off x="4126229" y="1544989"/>
+              <a:ext cx="0" cy="2861336"/>
+            </a:xfrm>
+            <a:prstGeom prst="line">
+              <a:avLst/>
+            </a:prstGeom>
+            <a:ln w="19050">
+              <a:solidFill>
+                <a:schemeClr val="tx1"/>
+              </a:solidFill>
+              <a:prstDash val="dash"/>
+            </a:ln>
+          </p:spPr>
+          <p:style>
+            <a:lnRef idx="1">
+              <a:schemeClr val="accent1"/>
+            </a:lnRef>
+            <a:fillRef idx="0">
+              <a:schemeClr val="accent1"/>
+            </a:fillRef>
+            <a:effectRef idx="0">
+              <a:schemeClr val="accent1"/>
+            </a:effectRef>
+            <a:fontRef idx="minor">
+              <a:schemeClr val="tx1"/>
+            </a:fontRef>
+          </p:style>
+        </p:cxnSp>
+        <p:sp>
+          <p:nvSpPr>
+            <p:cNvPr id="36" name="TextBox 35"/>
+            <p:cNvSpPr txBox="1"/>
+            <p:nvPr/>
+          </p:nvSpPr>
+          <p:spPr>
+            <a:xfrm>
+              <a:off x="6196614" y="2661899"/>
+              <a:ext cx="2073196" cy="584775"/>
+            </a:xfrm>
+            <a:prstGeom prst="rect">
+              <a:avLst/>
+            </a:prstGeom>
+            <a:noFill/>
+          </p:spPr>
+          <p:txBody>
+            <a:bodyPr wrap="none" rtlCol="0">
+              <a:spAutoFit/>
+            </a:bodyPr>
+            <a:lstStyle/>
+            <a:p>
+              <a:pPr algn="ctr"/>
+              <a:r>
+                <a:rPr lang="en-US" sz="1600" dirty="0" smtClean="0"/>
+                <a:t>Distance from </a:t>
+              </a:r>
+              <a:r>
+                <a:rPr lang="en-US" sz="1600" smtClean="0"/>
+                <a:t>starting </a:t>
+              </a:r>
+            </a:p>
+            <a:p>
+              <a:pPr algn="ctr"/>
+              <a:r>
+                <a:rPr lang="en-US" sz="1600" dirty="0" smtClean="0"/>
+                <a:t>rural population</a:t>
+              </a:r>
+              <a:endParaRPr lang="en-US" sz="1600" dirty="0"/>
+            </a:p>
+          </p:txBody>
+        </p:sp>
+        <p:sp>
+          <p:nvSpPr>
+            <p:cNvPr id="37" name="TextBox 36"/>
+            <p:cNvSpPr txBox="1"/>
+            <p:nvPr/>
+          </p:nvSpPr>
+          <p:spPr>
+            <a:xfrm>
+              <a:off x="2381309" y="1208154"/>
+              <a:ext cx="1652119" cy="584775"/>
+            </a:xfrm>
+            <a:prstGeom prst="rect">
+              <a:avLst/>
+            </a:prstGeom>
+            <a:noFill/>
+          </p:spPr>
+          <p:txBody>
+            <a:bodyPr wrap="none" rtlCol="0">
+              <a:spAutoFit/>
+            </a:bodyPr>
+            <a:lstStyle/>
+            <a:p>
+              <a:pPr algn="ctr"/>
+              <a:r>
+                <a:rPr lang="en-US" sz="1600" smtClean="0"/>
+                <a:t>Rural </a:t>
+              </a:r>
+            </a:p>
+            <a:p>
+              <a:pPr algn="ctr"/>
+              <a:r>
+                <a:rPr lang="en-US" sz="1600" dirty="0" smtClean="0"/>
+                <a:t>Selection for HCN</a:t>
+              </a:r>
+              <a:endParaRPr lang="en-US" sz="1600" dirty="0"/>
+            </a:p>
+          </p:txBody>
+        </p:sp>
+        <p:sp>
+          <p:nvSpPr>
+            <p:cNvPr id="38" name="TextBox 37"/>
+            <p:cNvSpPr txBox="1"/>
+            <p:nvPr/>
+          </p:nvSpPr>
+          <p:spPr>
+            <a:xfrm>
+              <a:off x="4308035" y="1204579"/>
+              <a:ext cx="2001317" cy="584775"/>
+            </a:xfrm>
+            <a:prstGeom prst="rect">
+              <a:avLst/>
+            </a:prstGeom>
+            <a:noFill/>
+          </p:spPr>
+          <p:txBody>
+            <a:bodyPr wrap="none" rtlCol="0">
+              <a:spAutoFit/>
+            </a:bodyPr>
+            <a:lstStyle/>
+            <a:p>
+              <a:pPr algn="ctr"/>
+              <a:r>
+                <a:rPr lang="en-US" sz="1600" dirty="0" smtClean="0"/>
+                <a:t>Urban</a:t>
+              </a:r>
+            </a:p>
+            <a:p>
+              <a:pPr algn="ctr"/>
+              <a:r>
+                <a:rPr lang="en-US" sz="1600" dirty="0" smtClean="0"/>
+                <a:t>Selection against HCN</a:t>
+              </a:r>
+              <a:endParaRPr lang="en-US" sz="1600" dirty="0"/>
+            </a:p>
+          </p:txBody>
+        </p:sp>
+        <p:sp>
+          <p:nvSpPr>
+            <p:cNvPr id="39" name="TextBox 38"/>
+            <p:cNvSpPr txBox="1"/>
+            <p:nvPr/>
+          </p:nvSpPr>
+          <p:spPr>
+            <a:xfrm rot="16200000">
+              <a:off x="1385642" y="2671395"/>
+              <a:ext cx="1186543" cy="584775"/>
+            </a:xfrm>
+            <a:prstGeom prst="rect">
+              <a:avLst/>
+            </a:prstGeom>
+            <a:noFill/>
+          </p:spPr>
+          <p:txBody>
+            <a:bodyPr wrap="none" rtlCol="0">
+              <a:spAutoFit/>
+            </a:bodyPr>
+            <a:lstStyle/>
+            <a:p>
+              <a:pPr algn="ctr"/>
+              <a:r>
+                <a:rPr lang="en-US" sz="1600" dirty="0" smtClean="0"/>
+                <a:t>Strength of </a:t>
+              </a:r>
+            </a:p>
+            <a:p>
+              <a:pPr algn="ctr"/>
+              <a:r>
+                <a:rPr lang="en-US" sz="1600" dirty="0" smtClean="0"/>
+                <a:t>selection (</a:t>
+              </a:r>
+              <a:r>
+                <a:rPr lang="en-US" sz="1600" i="1" dirty="0" smtClean="0"/>
+                <a:t>s</a:t>
+              </a:r>
+              <a:r>
+                <a:rPr lang="en-US" sz="1600" dirty="0" smtClean="0"/>
+                <a:t>)</a:t>
+              </a:r>
+              <a:endParaRPr lang="en-US" sz="1600" dirty="0"/>
+            </a:p>
+          </p:txBody>
+        </p:sp>
+        <p:cxnSp>
+          <p:nvCxnSpPr>
+            <p:cNvPr id="41" name="Straight Connector 40"/>
+            <p:cNvCxnSpPr/>
+            <p:nvPr/>
+          </p:nvCxnSpPr>
+          <p:spPr>
+            <a:xfrm>
+              <a:off x="2185059" y="1900053"/>
+              <a:ext cx="213757" cy="0"/>
+            </a:xfrm>
+            <a:prstGeom prst="line">
+              <a:avLst/>
+            </a:prstGeom>
+            <a:ln w="28575">
+              <a:solidFill>
+                <a:schemeClr val="tx1"/>
+              </a:solidFill>
+            </a:ln>
+          </p:spPr>
+          <p:style>
+            <a:lnRef idx="1">
+              <a:schemeClr val="accent1"/>
+            </a:lnRef>
+            <a:fillRef idx="0">
+              <a:schemeClr val="accent1"/>
+            </a:fillRef>
+            <a:effectRef idx="0">
+              <a:schemeClr val="accent1"/>
+            </a:effectRef>
+            <a:fontRef idx="minor">
+              <a:schemeClr val="tx1"/>
+            </a:fontRef>
+          </p:style>
+        </p:cxnSp>
+        <p:cxnSp>
+          <p:nvCxnSpPr>
+            <p:cNvPr id="43" name="Straight Connector 42"/>
+            <p:cNvCxnSpPr/>
+            <p:nvPr/>
+          </p:nvCxnSpPr>
+          <p:spPr>
+            <a:xfrm>
+              <a:off x="2194955" y="4035632"/>
+              <a:ext cx="213757" cy="0"/>
+            </a:xfrm>
+            <a:prstGeom prst="line">
+              <a:avLst/>
+            </a:prstGeom>
+            <a:ln w="28575">
+              <a:solidFill>
+                <a:schemeClr val="tx1"/>
+              </a:solidFill>
+            </a:ln>
+          </p:spPr>
+          <p:style>
+            <a:lnRef idx="1">
+              <a:schemeClr val="accent1"/>
+            </a:lnRef>
+            <a:fillRef idx="0">
+              <a:schemeClr val="accent1"/>
+            </a:fillRef>
+            <a:effectRef idx="0">
+              <a:schemeClr val="accent1"/>
+            </a:effectRef>
+            <a:fontRef idx="minor">
+              <a:schemeClr val="tx1"/>
+            </a:fontRef>
+          </p:style>
+        </p:cxnSp>
+      </p:grpSp>
+    </p:spTree>
+    <p:extLst>
+      <p:ext uri="{BB962C8B-B14F-4D97-AF65-F5344CB8AC3E}">
+        <p14:creationId xmlns:p14="http://schemas.microsoft.com/office/powerpoint/2010/main" val="1734675265"/>
+      </p:ext>
+    </p:extLst>
+  </p:cSld>
+  <p:clrMapOvr>
+    <a:masterClrMapping/>
+  </p:clrMapOvr>
 </p:sld>
 </file>
 

</xml_diff>

<commit_message>
Minor change to manuscript figures
</commit_message>
<xml_diff>
--- a/SEC_Manuscript-Figures.pptx
+++ b/SEC_Manuscript-Figures.pptx
@@ -250,7 +250,7 @@
           <a:p>
             <a:fld id="{188A7F6E-218E-D540-B78C-2025F8A16802}" type="datetimeFigureOut">
               <a:rPr lang="en-US" smtClean="0"/>
-              <a:t>12/31/17</a:t>
+              <a:t>1/2/18</a:t>
             </a:fld>
             <a:endParaRPr lang="en-US"/>
           </a:p>
@@ -415,7 +415,7 @@
           <a:p>
             <a:fld id="{188A7F6E-218E-D540-B78C-2025F8A16802}" type="datetimeFigureOut">
               <a:rPr lang="en-US" smtClean="0"/>
-              <a:t>12/31/17</a:t>
+              <a:t>1/2/18</a:t>
             </a:fld>
             <a:endParaRPr lang="en-US"/>
           </a:p>
@@ -590,7 +590,7 @@
           <a:p>
             <a:fld id="{188A7F6E-218E-D540-B78C-2025F8A16802}" type="datetimeFigureOut">
               <a:rPr lang="en-US" smtClean="0"/>
-              <a:t>12/31/17</a:t>
+              <a:t>1/2/18</a:t>
             </a:fld>
             <a:endParaRPr lang="en-US"/>
           </a:p>
@@ -755,7 +755,7 @@
           <a:p>
             <a:fld id="{188A7F6E-218E-D540-B78C-2025F8A16802}" type="datetimeFigureOut">
               <a:rPr lang="en-US" smtClean="0"/>
-              <a:t>12/31/17</a:t>
+              <a:t>1/2/18</a:t>
             </a:fld>
             <a:endParaRPr lang="en-US"/>
           </a:p>
@@ -994,7 +994,7 @@
           <a:p>
             <a:fld id="{188A7F6E-218E-D540-B78C-2025F8A16802}" type="datetimeFigureOut">
               <a:rPr lang="en-US" smtClean="0"/>
-              <a:t>12/31/17</a:t>
+              <a:t>1/2/18</a:t>
             </a:fld>
             <a:endParaRPr lang="en-US"/>
           </a:p>
@@ -1221,7 +1221,7 @@
           <a:p>
             <a:fld id="{188A7F6E-218E-D540-B78C-2025F8A16802}" type="datetimeFigureOut">
               <a:rPr lang="en-US" smtClean="0"/>
-              <a:t>12/31/17</a:t>
+              <a:t>1/2/18</a:t>
             </a:fld>
             <a:endParaRPr lang="en-US"/>
           </a:p>
@@ -1583,7 +1583,7 @@
           <a:p>
             <a:fld id="{188A7F6E-218E-D540-B78C-2025F8A16802}" type="datetimeFigureOut">
               <a:rPr lang="en-US" smtClean="0"/>
-              <a:t>12/31/17</a:t>
+              <a:t>1/2/18</a:t>
             </a:fld>
             <a:endParaRPr lang="en-US"/>
           </a:p>
@@ -1696,7 +1696,7 @@
           <a:p>
             <a:fld id="{188A7F6E-218E-D540-B78C-2025F8A16802}" type="datetimeFigureOut">
               <a:rPr lang="en-US" smtClean="0"/>
-              <a:t>12/31/17</a:t>
+              <a:t>1/2/18</a:t>
             </a:fld>
             <a:endParaRPr lang="en-US"/>
           </a:p>
@@ -1786,7 +1786,7 @@
           <a:p>
             <a:fld id="{188A7F6E-218E-D540-B78C-2025F8A16802}" type="datetimeFigureOut">
               <a:rPr lang="en-US" smtClean="0"/>
-              <a:t>12/31/17</a:t>
+              <a:t>1/2/18</a:t>
             </a:fld>
             <a:endParaRPr lang="en-US"/>
           </a:p>
@@ -2058,7 +2058,7 @@
           <a:p>
             <a:fld id="{188A7F6E-218E-D540-B78C-2025F8A16802}" type="datetimeFigureOut">
               <a:rPr lang="en-US" smtClean="0"/>
-              <a:t>12/31/17</a:t>
+              <a:t>1/2/18</a:t>
             </a:fld>
             <a:endParaRPr lang="en-US"/>
           </a:p>
@@ -2310,7 +2310,7 @@
           <a:p>
             <a:fld id="{188A7F6E-218E-D540-B78C-2025F8A16802}" type="datetimeFigureOut">
               <a:rPr lang="en-US" smtClean="0"/>
-              <a:t>12/31/17</a:t>
+              <a:t>1/2/18</a:t>
             </a:fld>
             <a:endParaRPr lang="en-US"/>
           </a:p>
@@ -2518,7 +2518,7 @@
           <a:p>
             <a:fld id="{188A7F6E-218E-D540-B78C-2025F8A16802}" type="datetimeFigureOut">
               <a:rPr lang="en-US" smtClean="0"/>
-              <a:t>12/31/17</a:t>
+              <a:t>1/2/18</a:t>
             </a:fld>
             <a:endParaRPr lang="en-US"/>
           </a:p>
@@ -10430,15 +10430,7 @@
                       <a:ea typeface="Helvetica" charset="0"/>
                       <a:cs typeface="Helvetica" charset="0"/>
                     </a:rPr>
-                    <a:t>Low migration </a:t>
-                  </a:r>
-                  <a:r>
-                    <a:rPr lang="en-US" sz="1200" dirty="0" smtClean="0">
-                      <a:latin typeface="Helvetica" charset="0"/>
-                      <a:ea typeface="Helvetica" charset="0"/>
-                      <a:cs typeface="Helvetica" charset="0"/>
-                    </a:rPr>
-                    <a:t>(m = 0.01)</a:t>
+                    <a:t>Low migration (m = 0.01)</a:t>
                   </a:r>
                   <a:endParaRPr lang="en-US" sz="1200" dirty="0">
                     <a:latin typeface="Helvetica" charset="0"/>
@@ -10476,15 +10468,7 @@
                       <a:ea typeface="Helvetica" charset="0"/>
                       <a:cs typeface="Helvetica" charset="0"/>
                     </a:rPr>
-                    <a:t>High </a:t>
-                  </a:r>
-                  <a:r>
-                    <a:rPr lang="en-US" sz="1200" dirty="0" smtClean="0">
-                      <a:latin typeface="Helvetica" charset="0"/>
-                      <a:ea typeface="Helvetica" charset="0"/>
-                      <a:cs typeface="Helvetica" charset="0"/>
-                    </a:rPr>
-                    <a:t>migration (m = 0.05)</a:t>
+                    <a:t>High migration (m = 0.05)</a:t>
                   </a:r>
                   <a:endParaRPr lang="en-US" sz="1200" dirty="0">
                     <a:latin typeface="Helvetica" charset="0"/>
@@ -12235,15 +12219,7 @@
                     <a:ea typeface="Helvetica" charset="0"/>
                     <a:cs typeface="Helvetica" charset="0"/>
                   </a:rPr>
-                  <a:t>Strong </a:t>
-                </a:r>
-                <a:r>
-                  <a:rPr lang="en-US" sz="1200" dirty="0" smtClean="0">
-                    <a:latin typeface="Helvetica" charset="0"/>
-                    <a:ea typeface="Helvetica" charset="0"/>
-                    <a:cs typeface="Helvetica" charset="0"/>
-                  </a:rPr>
-                  <a:t>founder </a:t>
+                  <a:t>Strong founder </a:t>
                 </a:r>
               </a:p>
               <a:p>
@@ -12253,15 +12229,7 @@
                     <a:ea typeface="Helvetica" charset="0"/>
                     <a:cs typeface="Helvetica" charset="0"/>
                   </a:rPr>
-                  <a:t>effect (prop. = 0.01</a:t>
-                </a:r>
-                <a:r>
-                  <a:rPr lang="en-US" sz="1200" dirty="0" smtClean="0">
-                    <a:latin typeface="Helvetica" charset="0"/>
-                    <a:ea typeface="Helvetica" charset="0"/>
-                    <a:cs typeface="Helvetica" charset="0"/>
-                  </a:rPr>
-                  <a:t>)</a:t>
+                  <a:t>effect (prop. = 0.01)</a:t>
                 </a:r>
                 <a:endParaRPr lang="en-US" sz="1200" dirty="0">
                   <a:latin typeface="Helvetica" charset="0"/>
@@ -12299,15 +12267,7 @@
                     <a:ea typeface="Helvetica" charset="0"/>
                     <a:cs typeface="Helvetica" charset="0"/>
                   </a:rPr>
-                  <a:t>Intermediate </a:t>
-                </a:r>
-                <a:r>
-                  <a:rPr lang="en-US" sz="1200" dirty="0" smtClean="0">
-                    <a:latin typeface="Helvetica" charset="0"/>
-                    <a:ea typeface="Helvetica" charset="0"/>
-                    <a:cs typeface="Helvetica" charset="0"/>
-                  </a:rPr>
-                  <a:t>founder </a:t>
+                  <a:t>Intermediate founder </a:t>
                 </a:r>
               </a:p>
               <a:p>
@@ -12317,15 +12277,7 @@
                     <a:ea typeface="Helvetica" charset="0"/>
                     <a:cs typeface="Helvetica" charset="0"/>
                   </a:rPr>
-                  <a:t>effect (prop</a:t>
-                </a:r>
-                <a:r>
-                  <a:rPr lang="en-US" sz="1200" dirty="0" smtClean="0">
-                    <a:latin typeface="Helvetica" charset="0"/>
-                    <a:ea typeface="Helvetica" charset="0"/>
-                    <a:cs typeface="Helvetica" charset="0"/>
-                  </a:rPr>
-                  <a:t>. = 0.2)</a:t>
+                  <a:t>effect (prop. = 0.2)</a:t>
                 </a:r>
                 <a:endParaRPr lang="en-US" sz="1200" dirty="0">
                   <a:latin typeface="Helvetica" charset="0"/>
@@ -12363,15 +12315,7 @@
                     <a:ea typeface="Helvetica" charset="0"/>
                     <a:cs typeface="Helvetica" charset="0"/>
                   </a:rPr>
-                  <a:t>No </a:t>
-                </a:r>
-                <a:r>
-                  <a:rPr lang="en-US" sz="1200" dirty="0" smtClean="0">
-                    <a:latin typeface="Helvetica" charset="0"/>
-                    <a:ea typeface="Helvetica" charset="0"/>
-                    <a:cs typeface="Helvetica" charset="0"/>
-                  </a:rPr>
-                  <a:t>founder </a:t>
+                  <a:t>No founder </a:t>
                 </a:r>
               </a:p>
               <a:p>
@@ -12381,23 +12325,7 @@
                     <a:ea typeface="Helvetica" charset="0"/>
                     <a:cs typeface="Helvetica" charset="0"/>
                   </a:rPr>
-                  <a:t>effect</a:t>
-                </a:r>
-                <a:r>
-                  <a:rPr lang="en-US" sz="1200" dirty="0" smtClean="0">
-                    <a:latin typeface="Helvetica" charset="0"/>
-                    <a:ea typeface="Helvetica" charset="0"/>
-                    <a:cs typeface="Helvetica" charset="0"/>
-                  </a:rPr>
-                  <a:t> </a:t>
-                </a:r>
-                <a:r>
-                  <a:rPr lang="en-US" sz="1200" dirty="0" smtClean="0">
-                    <a:latin typeface="Helvetica" charset="0"/>
-                    <a:ea typeface="Helvetica" charset="0"/>
-                    <a:cs typeface="Helvetica" charset="0"/>
-                  </a:rPr>
-                  <a:t>(prop. = 1.0)</a:t>
+                  <a:t>effect (prop. = 1.0)</a:t>
                 </a:r>
                 <a:endParaRPr lang="en-US" sz="1200" dirty="0">
                   <a:latin typeface="Helvetica" charset="0"/>
@@ -13311,7 +13239,7 @@
           </p:nvSpPr>
           <p:spPr>
             <a:xfrm>
-              <a:off x="2883817" y="10326413"/>
+              <a:off x="3095849" y="10326413"/>
               <a:ext cx="3154774" cy="338554"/>
             </a:xfrm>
             <a:prstGeom prst="rect">

</xml_diff>